<commit_message>
updates layout, new theme
</commit_message>
<xml_diff>
--- a/logo/szekelydata logo2.pptx
+++ b/logo/szekelydata logo2.pptx
@@ -9,9 +9,11 @@
     <p:sldId id="258" r:id="rId3"/>
     <p:sldId id="259" r:id="rId4"/>
     <p:sldId id="260" r:id="rId5"/>
-    <p:sldId id="261" r:id="rId6"/>
-    <p:sldId id="262" r:id="rId7"/>
-    <p:sldId id="263" r:id="rId8"/>
+    <p:sldId id="264" r:id="rId6"/>
+    <p:sldId id="261" r:id="rId7"/>
+    <p:sldId id="262" r:id="rId8"/>
+    <p:sldId id="263" r:id="rId9"/>
+    <p:sldId id="265" r:id="rId10"/>
   </p:sldIdLst>
   <p:sldSz cx="12192000" cy="6858000"/>
   <p:notesSz cx="6858000" cy="9144000"/>
@@ -277,7 +279,7 @@
           <a:p>
             <a:fld id="{18E8E0FF-2D50-4C17-A871-A3C9A189B845}" type="datetimeFigureOut">
               <a:rPr lang="en-US" smtClean="0"/>
-              <a:t>11/18/2018</a:t>
+              <a:t>12/18/2018</a:t>
             </a:fld>
             <a:endParaRPr lang="en-US"/>
           </a:p>
@@ -475,7 +477,7 @@
           <a:p>
             <a:fld id="{18E8E0FF-2D50-4C17-A871-A3C9A189B845}" type="datetimeFigureOut">
               <a:rPr lang="en-US" smtClean="0"/>
-              <a:t>11/18/2018</a:t>
+              <a:t>12/18/2018</a:t>
             </a:fld>
             <a:endParaRPr lang="en-US"/>
           </a:p>
@@ -683,7 +685,7 @@
           <a:p>
             <a:fld id="{18E8E0FF-2D50-4C17-A871-A3C9A189B845}" type="datetimeFigureOut">
               <a:rPr lang="en-US" smtClean="0"/>
-              <a:t>11/18/2018</a:t>
+              <a:t>12/18/2018</a:t>
             </a:fld>
             <a:endParaRPr lang="en-US"/>
           </a:p>
@@ -881,7 +883,7 @@
           <a:p>
             <a:fld id="{18E8E0FF-2D50-4C17-A871-A3C9A189B845}" type="datetimeFigureOut">
               <a:rPr lang="en-US" smtClean="0"/>
-              <a:t>11/18/2018</a:t>
+              <a:t>12/18/2018</a:t>
             </a:fld>
             <a:endParaRPr lang="en-US"/>
           </a:p>
@@ -1156,7 +1158,7 @@
           <a:p>
             <a:fld id="{18E8E0FF-2D50-4C17-A871-A3C9A189B845}" type="datetimeFigureOut">
               <a:rPr lang="en-US" smtClean="0"/>
-              <a:t>11/18/2018</a:t>
+              <a:t>12/18/2018</a:t>
             </a:fld>
             <a:endParaRPr lang="en-US"/>
           </a:p>
@@ -1421,7 +1423,7 @@
           <a:p>
             <a:fld id="{18E8E0FF-2D50-4C17-A871-A3C9A189B845}" type="datetimeFigureOut">
               <a:rPr lang="en-US" smtClean="0"/>
-              <a:t>11/18/2018</a:t>
+              <a:t>12/18/2018</a:t>
             </a:fld>
             <a:endParaRPr lang="en-US"/>
           </a:p>
@@ -1833,7 +1835,7 @@
           <a:p>
             <a:fld id="{18E8E0FF-2D50-4C17-A871-A3C9A189B845}" type="datetimeFigureOut">
               <a:rPr lang="en-US" smtClean="0"/>
-              <a:t>11/18/2018</a:t>
+              <a:t>12/18/2018</a:t>
             </a:fld>
             <a:endParaRPr lang="en-US"/>
           </a:p>
@@ -1974,7 +1976,7 @@
           <a:p>
             <a:fld id="{18E8E0FF-2D50-4C17-A871-A3C9A189B845}" type="datetimeFigureOut">
               <a:rPr lang="en-US" smtClean="0"/>
-              <a:t>11/18/2018</a:t>
+              <a:t>12/18/2018</a:t>
             </a:fld>
             <a:endParaRPr lang="en-US"/>
           </a:p>
@@ -2087,7 +2089,7 @@
           <a:p>
             <a:fld id="{18E8E0FF-2D50-4C17-A871-A3C9A189B845}" type="datetimeFigureOut">
               <a:rPr lang="en-US" smtClean="0"/>
-              <a:t>11/18/2018</a:t>
+              <a:t>12/18/2018</a:t>
             </a:fld>
             <a:endParaRPr lang="en-US"/>
           </a:p>
@@ -2398,7 +2400,7 @@
           <a:p>
             <a:fld id="{18E8E0FF-2D50-4C17-A871-A3C9A189B845}" type="datetimeFigureOut">
               <a:rPr lang="en-US" smtClean="0"/>
-              <a:t>11/18/2018</a:t>
+              <a:t>12/18/2018</a:t>
             </a:fld>
             <a:endParaRPr lang="en-US"/>
           </a:p>
@@ -2686,7 +2688,7 @@
           <a:p>
             <a:fld id="{18E8E0FF-2D50-4C17-A871-A3C9A189B845}" type="datetimeFigureOut">
               <a:rPr lang="en-US" smtClean="0"/>
-              <a:t>11/18/2018</a:t>
+              <a:t>12/18/2018</a:t>
             </a:fld>
             <a:endParaRPr lang="en-US"/>
           </a:p>
@@ -2927,7 +2929,7 @@
           <a:p>
             <a:fld id="{18E8E0FF-2D50-4C17-A871-A3C9A189B845}" type="datetimeFigureOut">
               <a:rPr lang="en-US" smtClean="0"/>
-              <a:t>11/18/2018</a:t>
+              <a:t>12/18/2018</a:t>
             </a:fld>
             <a:endParaRPr lang="en-US"/>
           </a:p>
@@ -4818,6 +4820,143 @@
           <a:chExt cx="0" cy="0"/>
         </a:xfrm>
       </p:grpSpPr>
+      <p:sp>
+        <p:nvSpPr>
+          <p:cNvPr id="9" name="TextBox 8">
+            <a:extLst>
+              <a:ext uri="{FF2B5EF4-FFF2-40B4-BE49-F238E27FC236}">
+                <a16:creationId xmlns:a16="http://schemas.microsoft.com/office/drawing/2014/main" id="{44F8CD09-5FFA-422B-9DE7-3F17F3C739E1}"/>
+              </a:ext>
+            </a:extLst>
+          </p:cNvPr>
+          <p:cNvSpPr txBox="1"/>
+          <p:nvPr/>
+        </p:nvSpPr>
+        <p:spPr>
+          <a:xfrm>
+            <a:off x="1924774" y="645850"/>
+            <a:ext cx="9390926" cy="2031325"/>
+          </a:xfrm>
+          <a:prstGeom prst="rect">
+            <a:avLst/>
+          </a:prstGeom>
+          <a:noFill/>
+        </p:spPr>
+        <p:txBody>
+          <a:bodyPr wrap="square" rtlCol="0">
+            <a:spAutoFit/>
+          </a:bodyPr>
+          <a:lstStyle/>
+          <a:p>
+            <a:pPr algn="ctr"/>
+            <a:r>
+              <a:rPr lang="hu-HU" sz="12600" b="1" dirty="0">
+                <a:ln w="28575">
+                  <a:solidFill>
+                    <a:schemeClr val="tx1"/>
+                  </a:solidFill>
+                </a:ln>
+                <a:solidFill>
+                  <a:srgbClr val="FE0100"/>
+                </a:solidFill>
+                <a:latin typeface="Bahnschrift" panose="020B0502040204020203" pitchFamily="34" charset="0"/>
+              </a:rPr>
+              <a:t>székel</a:t>
+            </a:r>
+            <a:r>
+              <a:rPr lang="hu-HU" sz="12400" b="1" dirty="0">
+                <a:ln w="28575">
+                  <a:solidFill>
+                    <a:schemeClr val="tx1"/>
+                  </a:solidFill>
+                </a:ln>
+                <a:solidFill>
+                  <a:srgbClr val="FE0100"/>
+                </a:solidFill>
+                <a:latin typeface="Bahnschrift" panose="020B0502040204020203" pitchFamily="34" charset="0"/>
+              </a:rPr>
+              <a:t>y</a:t>
+            </a:r>
+            <a:r>
+              <a:rPr lang="en-GB" sz="12400" b="1" dirty="0">
+                <a:latin typeface="Bahnschrift" panose="020B0502040204020203" pitchFamily="34" charset="0"/>
+              </a:rPr>
+              <a:t>data</a:t>
+            </a:r>
+            <a:endParaRPr lang="en-US" sz="12400" b="1" dirty="0">
+              <a:latin typeface="Bahnschrift" panose="020B0502040204020203" pitchFamily="34" charset="0"/>
+            </a:endParaRPr>
+          </a:p>
+        </p:txBody>
+      </p:sp>
+      <p:pic>
+        <p:nvPicPr>
+          <p:cNvPr id="13" name="Graphic 12" descr="Snowflake">
+            <a:extLst>
+              <a:ext uri="{FF2B5EF4-FFF2-40B4-BE49-F238E27FC236}">
+                <a16:creationId xmlns:a16="http://schemas.microsoft.com/office/drawing/2014/main" id="{089F0FCD-74A5-49FD-AAD6-A6C18808A0E9}"/>
+              </a:ext>
+            </a:extLst>
+          </p:cNvPr>
+          <p:cNvPicPr>
+            <a:picLocks noChangeAspect="1"/>
+          </p:cNvPicPr>
+          <p:nvPr/>
+        </p:nvPicPr>
+        <p:blipFill rotWithShape="1">
+          <a:blip r:embed="rId2">
+            <a:extLst>
+              <a:ext uri="{28A0092B-C50C-407E-A947-70E740481C1C}">
+                <a14:useLocalDpi xmlns:a14="http://schemas.microsoft.com/office/drawing/2010/main" val="0"/>
+              </a:ext>
+              <a:ext uri="{96DAC541-7B7A-43D3-8B79-37D633B846F1}">
+                <asvg:svgBlip xmlns:asvg="http://schemas.microsoft.com/office/drawing/2016/SVG/main" r:embed="rId3"/>
+              </a:ext>
+            </a:extLst>
+          </a:blip>
+          <a:srcRect l="9739" t="9739" r="9739" b="9739"/>
+          <a:stretch/>
+        </p:blipFill>
+        <p:spPr>
+          <a:xfrm>
+            <a:off x="275894" y="735712"/>
+            <a:ext cx="2210130" cy="2210130"/>
+          </a:xfrm>
+          <a:prstGeom prst="rect">
+            <a:avLst/>
+          </a:prstGeom>
+        </p:spPr>
+      </p:pic>
+    </p:spTree>
+    <p:extLst>
+      <p:ext uri="{BB962C8B-B14F-4D97-AF65-F5344CB8AC3E}">
+        <p14:creationId xmlns:p14="http://schemas.microsoft.com/office/powerpoint/2010/main" val="3315524059"/>
+      </p:ext>
+    </p:extLst>
+  </p:cSld>
+  <p:clrMapOvr>
+    <a:masterClrMapping/>
+  </p:clrMapOvr>
+</p:sld>
+</file>
+
+<file path=ppt/slides/slide6.xml><?xml version="1.0" encoding="utf-8"?>
+<p:sld xmlns:a="http://schemas.openxmlformats.org/drawingml/2006/main" xmlns:r="http://schemas.openxmlformats.org/officeDocument/2006/relationships" xmlns:p="http://schemas.openxmlformats.org/presentationml/2006/main">
+  <p:cSld>
+    <p:spTree>
+      <p:nvGrpSpPr>
+        <p:cNvPr id="1" name=""/>
+        <p:cNvGrpSpPr/>
+        <p:nvPr/>
+      </p:nvGrpSpPr>
+      <p:grpSpPr>
+        <a:xfrm>
+          <a:off x="0" y="0"/>
+          <a:ext cx="0" cy="0"/>
+          <a:chOff x="0" y="0"/>
+          <a:chExt cx="0" cy="0"/>
+        </a:xfrm>
+      </p:grpSpPr>
       <p:grpSp>
         <p:nvGrpSpPr>
           <p:cNvPr id="5" name="Group 4">
@@ -5028,7 +5167,7 @@
 </p:sld>
 </file>
 
-<file path=ppt/slides/slide6.xml><?xml version="1.0" encoding="utf-8"?>
+<file path=ppt/slides/slide7.xml><?xml version="1.0" encoding="utf-8"?>
 <p:sld xmlns:a="http://schemas.openxmlformats.org/drawingml/2006/main" xmlns:r="http://schemas.openxmlformats.org/officeDocument/2006/relationships" xmlns:p="http://schemas.openxmlformats.org/presentationml/2006/main">
   <p:cSld>
     <p:spTree>
@@ -5593,7 +5732,7 @@
 </p:sld>
 </file>
 
-<file path=ppt/slides/slide7.xml><?xml version="1.0" encoding="utf-8"?>
+<file path=ppt/slides/slide8.xml><?xml version="1.0" encoding="utf-8"?>
 <p:sld xmlns:a="http://schemas.openxmlformats.org/drawingml/2006/main" xmlns:r="http://schemas.openxmlformats.org/officeDocument/2006/relationships" xmlns:p="http://schemas.openxmlformats.org/presentationml/2006/main">
   <p:cSld>
     <p:spTree>
@@ -5688,389 +5827,6 @@
           <a:xfrm>
             <a:off x="2662487" y="9221"/>
             <a:ext cx="6867026" cy="7182411"/>
-          </a:xfrm>
-          <a:prstGeom prst="rect">
-            <a:avLst/>
-          </a:prstGeom>
-        </p:spPr>
-      </p:pic>
-      <p:sp>
-        <p:nvSpPr>
-          <p:cNvPr id="17" name="TextBox 16"/>
-          <p:cNvSpPr txBox="1"/>
-          <p:nvPr/>
-        </p:nvSpPr>
-        <p:spPr>
-          <a:xfrm>
-            <a:off x="6765555" y="2607606"/>
-            <a:ext cx="1364476" cy="400110"/>
-          </a:xfrm>
-          <a:prstGeom prst="rect">
-            <a:avLst/>
-          </a:prstGeom>
-          <a:noFill/>
-        </p:spPr>
-        <p:txBody>
-          <a:bodyPr wrap="none" rtlCol="0">
-            <a:spAutoFit/>
-          </a:bodyPr>
-          <a:lstStyle/>
-          <a:p>
-            <a:pPr algn="ctr"/>
-            <a:r>
-              <a:rPr lang="hu-HU" sz="2000" b="1" cap="small" dirty="0">
-                <a:solidFill>
-                  <a:schemeClr val="bg1">
-                    <a:lumMod val="75000"/>
-                  </a:schemeClr>
-                </a:solidFill>
-                <a:latin typeface="Segoe UI Emoji" panose="020B0502040204020203" pitchFamily="34" charset="0"/>
-                <a:ea typeface="Segoe UI Emoji" panose="020B0502040204020203" pitchFamily="34" charset="0"/>
-              </a:rPr>
-              <a:t>köszönjük!</a:t>
-            </a:r>
-            <a:endParaRPr lang="en-GB" sz="2000" cap="small" dirty="0">
-              <a:solidFill>
-                <a:schemeClr val="bg1">
-                  <a:lumMod val="75000"/>
-                </a:schemeClr>
-              </a:solidFill>
-              <a:latin typeface="Segoe UI Emoji" panose="020B0502040204020203" pitchFamily="34" charset="0"/>
-              <a:ea typeface="Segoe UI Emoji" panose="020B0502040204020203" pitchFamily="34" charset="0"/>
-            </a:endParaRPr>
-          </a:p>
-        </p:txBody>
-      </p:sp>
-      <p:sp>
-        <p:nvSpPr>
-          <p:cNvPr id="18" name="TextBox 17"/>
-          <p:cNvSpPr txBox="1"/>
-          <p:nvPr/>
-        </p:nvSpPr>
-        <p:spPr>
-          <a:xfrm>
-            <a:off x="3674591" y="2669162"/>
-            <a:ext cx="1880643" cy="338554"/>
-          </a:xfrm>
-          <a:prstGeom prst="rect">
-            <a:avLst/>
-          </a:prstGeom>
-          <a:noFill/>
-        </p:spPr>
-        <p:txBody>
-          <a:bodyPr wrap="none" rtlCol="0">
-            <a:spAutoFit/>
-          </a:bodyPr>
-          <a:lstStyle/>
-          <a:p>
-            <a:pPr algn="ctr"/>
-            <a:r>
-              <a:rPr lang="en-US" sz="1600" b="1" cap="small" dirty="0">
-                <a:solidFill>
-                  <a:schemeClr val="bg1">
-                    <a:lumMod val="75000"/>
-                  </a:schemeClr>
-                </a:solidFill>
-                <a:latin typeface="Segoe UI Emoji" panose="020B0502040204020203" pitchFamily="34" charset="0"/>
-                <a:ea typeface="Segoe UI Emoji" panose="020B0502040204020203" pitchFamily="34" charset="0"/>
-              </a:rPr>
-              <a:t>1000</a:t>
-            </a:r>
-            <a:r>
-              <a:rPr lang="hu-HU" sz="1600" b="1" cap="small" dirty="0">
-                <a:solidFill>
-                  <a:schemeClr val="bg1">
-                    <a:lumMod val="75000"/>
-                  </a:schemeClr>
-                </a:solidFill>
-                <a:latin typeface="Segoe UI Emoji" panose="020B0502040204020203" pitchFamily="34" charset="0"/>
-                <a:ea typeface="Segoe UI Emoji" panose="020B0502040204020203" pitchFamily="34" charset="0"/>
-              </a:rPr>
-              <a:t> </a:t>
-            </a:r>
-            <a:r>
-              <a:rPr lang="hu-HU" sz="1600" cap="small" dirty="0">
-                <a:solidFill>
-                  <a:schemeClr val="bg1">
-                    <a:lumMod val="75000"/>
-                  </a:schemeClr>
-                </a:solidFill>
-                <a:latin typeface="Segoe UI Emoji" panose="020B0502040204020203" pitchFamily="34" charset="0"/>
-                <a:ea typeface="Segoe UI Emoji" panose="020B0502040204020203" pitchFamily="34" charset="0"/>
-              </a:rPr>
-              <a:t>adatvarázsló</a:t>
-            </a:r>
-            <a:endParaRPr lang="en-US" sz="1600" cap="small" dirty="0">
-              <a:solidFill>
-                <a:schemeClr val="bg1">
-                  <a:lumMod val="75000"/>
-                </a:schemeClr>
-              </a:solidFill>
-              <a:latin typeface="Segoe UI Emoji" panose="020B0502040204020203" pitchFamily="34" charset="0"/>
-              <a:ea typeface="Segoe UI Emoji" panose="020B0502040204020203" pitchFamily="34" charset="0"/>
-            </a:endParaRPr>
-          </a:p>
-        </p:txBody>
-      </p:sp>
-      <p:sp>
-        <p:nvSpPr>
-          <p:cNvPr id="4" name="Rectangle 3"/>
-          <p:cNvSpPr/>
-          <p:nvPr/>
-        </p:nvSpPr>
-        <p:spPr>
-          <a:xfrm rot="16200000" flipH="1">
-            <a:off x="6053287" y="1170749"/>
-            <a:ext cx="36000" cy="4997788"/>
-          </a:xfrm>
-          <a:prstGeom prst="rect">
-            <a:avLst/>
-          </a:prstGeom>
-          <a:gradFill flip="none" rotWithShape="1">
-            <a:gsLst>
-              <a:gs pos="27000">
-                <a:srgbClr val="B5B7BB"/>
-              </a:gs>
-              <a:gs pos="76000">
-                <a:srgbClr val="C2C7CE"/>
-              </a:gs>
-              <a:gs pos="0">
-                <a:schemeClr val="bg1">
-                  <a:lumMod val="65000"/>
-                  <a:alpha val="0"/>
-                </a:schemeClr>
-              </a:gs>
-              <a:gs pos="100000">
-                <a:schemeClr val="accent1">
-                  <a:tint val="23500"/>
-                  <a:satMod val="160000"/>
-                  <a:alpha val="0"/>
-                </a:schemeClr>
-              </a:gs>
-            </a:gsLst>
-            <a:lin ang="5400000" scaled="1"/>
-            <a:tileRect/>
-          </a:gradFill>
-          <a:ln>
-            <a:noFill/>
-          </a:ln>
-        </p:spPr>
-        <p:style>
-          <a:lnRef idx="2">
-            <a:schemeClr val="accent1">
-              <a:shade val="50000"/>
-            </a:schemeClr>
-          </a:lnRef>
-          <a:fillRef idx="1">
-            <a:schemeClr val="accent1"/>
-          </a:fillRef>
-          <a:effectRef idx="0">
-            <a:schemeClr val="accent1"/>
-          </a:effectRef>
-          <a:fontRef idx="minor">
-            <a:schemeClr val="lt1"/>
-          </a:fontRef>
-        </p:style>
-        <p:txBody>
-          <a:bodyPr rtlCol="0" anchor="ctr"/>
-          <a:lstStyle/>
-          <a:p>
-            <a:pPr algn="ctr"/>
-            <a:endParaRPr lang="en-GB"/>
-          </a:p>
-        </p:txBody>
-      </p:sp>
-      <p:sp>
-        <p:nvSpPr>
-          <p:cNvPr id="20" name="TextBox 19"/>
-          <p:cNvSpPr txBox="1"/>
-          <p:nvPr/>
-        </p:nvSpPr>
-        <p:spPr>
-          <a:xfrm>
-            <a:off x="5003264" y="3999808"/>
-            <a:ext cx="2484976" cy="785151"/>
-          </a:xfrm>
-          <a:prstGeom prst="rect">
-            <a:avLst/>
-          </a:prstGeom>
-          <a:noFill/>
-        </p:spPr>
-        <p:txBody>
-          <a:bodyPr wrap="none" rtlCol="0">
-            <a:spAutoFit/>
-          </a:bodyPr>
-          <a:lstStyle/>
-          <a:p>
-            <a:pPr>
-              <a:lnSpc>
-                <a:spcPct val="150000"/>
-              </a:lnSpc>
-            </a:pPr>
-            <a:r>
-              <a:rPr lang="hu-HU" sz="1600" cap="small" dirty="0">
-                <a:solidFill>
-                  <a:schemeClr val="bg1">
-                    <a:lumMod val="75000"/>
-                  </a:schemeClr>
-                </a:solidFill>
-                <a:latin typeface="Segoe UI Emoji" panose="020B0502040204020203" pitchFamily="34" charset="0"/>
-                <a:ea typeface="Segoe UI Emoji" panose="020B0502040204020203" pitchFamily="34" charset="0"/>
-              </a:rPr>
-              <a:t>szekelydata.csaladen.es</a:t>
-            </a:r>
-          </a:p>
-          <a:p>
-            <a:pPr>
-              <a:lnSpc>
-                <a:spcPct val="150000"/>
-              </a:lnSpc>
-            </a:pPr>
-            <a:r>
-              <a:rPr lang="hu-HU" sz="1600" cap="small" dirty="0">
-                <a:solidFill>
-                  <a:schemeClr val="bg1">
-                    <a:lumMod val="75000"/>
-                  </a:schemeClr>
-                </a:solidFill>
-                <a:latin typeface="Segoe UI Emoji" panose="020B0502040204020203" pitchFamily="34" charset="0"/>
-                <a:ea typeface="Segoe UI Emoji" panose="020B0502040204020203" pitchFamily="34" charset="0"/>
-              </a:rPr>
-              <a:t>facebook.com/szekelydata</a:t>
-            </a:r>
-            <a:endParaRPr lang="en-GB" sz="1600" cap="small" dirty="0">
-              <a:solidFill>
-                <a:schemeClr val="bg1">
-                  <a:lumMod val="75000"/>
-                </a:schemeClr>
-              </a:solidFill>
-              <a:latin typeface="Segoe UI Emoji" panose="020B0502040204020203" pitchFamily="34" charset="0"/>
-              <a:ea typeface="Segoe UI Emoji" panose="020B0502040204020203" pitchFamily="34" charset="0"/>
-            </a:endParaRPr>
-          </a:p>
-        </p:txBody>
-      </p:sp>
-      <p:pic>
-        <p:nvPicPr>
-          <p:cNvPr id="3" name="Picture 2">
-            <a:extLst>
-              <a:ext uri="{FF2B5EF4-FFF2-40B4-BE49-F238E27FC236}">
-                <a16:creationId xmlns:a16="http://schemas.microsoft.com/office/drawing/2014/main" id="{73AA9B91-375B-4572-8D41-2C8D9A45E9EE}"/>
-              </a:ext>
-            </a:extLst>
-          </p:cNvPr>
-          <p:cNvPicPr>
-            <a:picLocks noChangeAspect="1"/>
-          </p:cNvPicPr>
-          <p:nvPr/>
-        </p:nvPicPr>
-        <p:blipFill rotWithShape="1">
-          <a:blip r:embed="rId4"/>
-          <a:srcRect l="13467" r="13467" b="8646"/>
-          <a:stretch/>
-        </p:blipFill>
-        <p:spPr>
-          <a:xfrm>
-            <a:off x="5798695" y="2446474"/>
-            <a:ext cx="723399" cy="722376"/>
-          </a:xfrm>
-          <a:prstGeom prst="roundRect">
-            <a:avLst>
-              <a:gd name="adj" fmla="val 8594"/>
-            </a:avLst>
-          </a:prstGeom>
-          <a:solidFill>
-            <a:srgbClr val="FFFFFF">
-              <a:shade val="85000"/>
-            </a:srgbClr>
-          </a:solidFill>
-          <a:ln>
-            <a:noFill/>
-          </a:ln>
-          <a:effectLst>
-            <a:reflection blurRad="12700" stA="38000" endPos="28000" dist="5000" dir="5400000" sy="-100000" algn="bl" rotWithShape="0"/>
-          </a:effectLst>
-        </p:spPr>
-      </p:pic>
-      <p:pic>
-        <p:nvPicPr>
-          <p:cNvPr id="1026" name="Picture 2" descr="Facebook logo | Logok">
-            <a:extLst>
-              <a:ext uri="{FF2B5EF4-FFF2-40B4-BE49-F238E27FC236}">
-                <a16:creationId xmlns:a16="http://schemas.microsoft.com/office/drawing/2014/main" id="{495BE7B9-FFF4-4648-A32D-85BC740E70B8}"/>
-              </a:ext>
-            </a:extLst>
-          </p:cNvPr>
-          <p:cNvPicPr>
-            <a:picLocks noChangeAspect="1" noChangeArrowheads="1"/>
-          </p:cNvPicPr>
-          <p:nvPr/>
-        </p:nvPicPr>
-        <p:blipFill>
-          <a:blip r:embed="rId5">
-            <a:extLst>
-              <a:ext uri="{28A0092B-C50C-407E-A947-70E740481C1C}">
-                <a14:useLocalDpi xmlns:a14="http://schemas.microsoft.com/office/drawing/2010/main" val="0"/>
-              </a:ext>
-            </a:extLst>
-          </a:blip>
-          <a:srcRect/>
-          <a:stretch>
-            <a:fillRect/>
-          </a:stretch>
-        </p:blipFill>
-        <p:spPr bwMode="auto">
-          <a:xfrm>
-            <a:off x="4668444" y="4433513"/>
-            <a:ext cx="486065" cy="345646"/>
-          </a:xfrm>
-          <a:prstGeom prst="rect">
-            <a:avLst/>
-          </a:prstGeom>
-          <a:noFill/>
-          <a:extLst>
-            <a:ext uri="{909E8E84-426E-40DD-AFC4-6F175D3DCCD1}">
-              <a14:hiddenFill xmlns:a14="http://schemas.microsoft.com/office/drawing/2010/main">
-                <a:solidFill>
-                  <a:srgbClr val="FFFFFF"/>
-                </a:solidFill>
-              </a14:hiddenFill>
-            </a:ext>
-          </a:extLst>
-        </p:spPr>
-      </p:pic>
-      <p:pic>
-        <p:nvPicPr>
-          <p:cNvPr id="19" name="Graphic 18" descr="Snowflake">
-            <a:extLst>
-              <a:ext uri="{FF2B5EF4-FFF2-40B4-BE49-F238E27FC236}">
-                <a16:creationId xmlns:a16="http://schemas.microsoft.com/office/drawing/2014/main" id="{84E30C7F-7F60-4FBD-BF7A-A3F89B51C467}"/>
-              </a:ext>
-            </a:extLst>
-          </p:cNvPr>
-          <p:cNvPicPr>
-            <a:picLocks noChangeAspect="1"/>
-          </p:cNvPicPr>
-          <p:nvPr/>
-        </p:nvPicPr>
-        <p:blipFill rotWithShape="1">
-          <a:blip r:embed="rId6">
-            <a:extLst>
-              <a:ext uri="{28A0092B-C50C-407E-A947-70E740481C1C}">
-                <a14:useLocalDpi xmlns:a14="http://schemas.microsoft.com/office/drawing/2010/main" val="0"/>
-              </a:ext>
-              <a:ext uri="{96DAC541-7B7A-43D3-8B79-37D633B846F1}">
-                <asvg:svgBlip xmlns:asvg="http://schemas.microsoft.com/office/drawing/2016/SVG/main" r:embed="rId7"/>
-              </a:ext>
-            </a:extLst>
-          </a:blip>
-          <a:srcRect l="9739" t="9739" r="9739" b="9739"/>
-          <a:stretch/>
-        </p:blipFill>
-        <p:spPr>
-          <a:xfrm>
-            <a:off x="4778430" y="4128130"/>
-            <a:ext cx="274262" cy="274262"/>
           </a:xfrm>
           <a:prstGeom prst="rect">
             <a:avLst/>
@@ -6155,6 +5911,82 @@
       </p:par>
     </p:tnLst>
   </p:timing>
+</p:sld>
+</file>
+
+<file path=ppt/slides/slide9.xml><?xml version="1.0" encoding="utf-8"?>
+<p:sld xmlns:a="http://schemas.openxmlformats.org/drawingml/2006/main" xmlns:r="http://schemas.openxmlformats.org/officeDocument/2006/relationships" xmlns:p="http://schemas.openxmlformats.org/presentationml/2006/main">
+  <p:cSld>
+    <p:spTree>
+      <p:nvGrpSpPr>
+        <p:cNvPr id="1" name=""/>
+        <p:cNvGrpSpPr/>
+        <p:nvPr/>
+      </p:nvGrpSpPr>
+      <p:grpSpPr>
+        <a:xfrm>
+          <a:off x="0" y="0"/>
+          <a:ext cx="0" cy="0"/>
+          <a:chOff x="0" y="0"/>
+          <a:chExt cx="0" cy="0"/>
+        </a:xfrm>
+      </p:grpSpPr>
+      <p:sp>
+        <p:nvSpPr>
+          <p:cNvPr id="2" name="Rectangle 1"/>
+          <p:cNvSpPr/>
+          <p:nvPr/>
+        </p:nvSpPr>
+        <p:spPr>
+          <a:xfrm>
+            <a:off x="0" y="0"/>
+            <a:ext cx="12192000" cy="6858000"/>
+          </a:xfrm>
+          <a:prstGeom prst="rect">
+            <a:avLst/>
+          </a:prstGeom>
+          <a:solidFill>
+            <a:srgbClr val="E6E6E6"/>
+          </a:solidFill>
+          <a:ln>
+            <a:noFill/>
+          </a:ln>
+        </p:spPr>
+        <p:style>
+          <a:lnRef idx="2">
+            <a:schemeClr val="accent1">
+              <a:shade val="50000"/>
+            </a:schemeClr>
+          </a:lnRef>
+          <a:fillRef idx="1">
+            <a:schemeClr val="accent1"/>
+          </a:fillRef>
+          <a:effectRef idx="0">
+            <a:schemeClr val="accent1"/>
+          </a:effectRef>
+          <a:fontRef idx="minor">
+            <a:schemeClr val="lt1"/>
+          </a:fontRef>
+        </p:style>
+        <p:txBody>
+          <a:bodyPr rtlCol="0" anchor="ctr"/>
+          <a:lstStyle/>
+          <a:p>
+            <a:pPr algn="ctr"/>
+            <a:endParaRPr lang="en-GB" dirty="0"/>
+          </a:p>
+        </p:txBody>
+      </p:sp>
+    </p:spTree>
+    <p:extLst>
+      <p:ext uri="{BB962C8B-B14F-4D97-AF65-F5344CB8AC3E}">
+        <p14:creationId xmlns:p14="http://schemas.microsoft.com/office/powerpoint/2010/main" val="2155476024"/>
+      </p:ext>
+    </p:extLst>
+  </p:cSld>
+  <p:clrMapOvr>
+    <a:masterClrMapping/>
+  </p:clrMapOvr>
 </p:sld>
 </file>
 

</xml_diff>